<commit_message>
New finding in report and presentation
</commit_message>
<xml_diff>
--- a/presentation.pptx
+++ b/presentation.pptx
@@ -19429,34 +19429,48 @@
           <a:lstStyle/>
           <a:p>
             <a:r>
-              <a:rPr lang="en-US"/>
-              <a:t>NSS score: 1.41</a:t>
+              <a:rPr lang="en-US" dirty="0"/>
+              <a:t>NSS score: 1.4</a:t>
             </a:r>
-          </a:p>
-          <a:p>
+            <a:r>
+              <a:rPr lang="el-GR" dirty="0"/>
+              <a:t>3</a:t>
+            </a:r>
+            <a:endParaRPr lang="en-US" dirty="0"/>
+          </a:p>
+          <a:p>
+            <a:r>
+              <a:rPr lang="en-US" dirty="0"/>
+              <a:t>Compared to minimum human baseline of 1.54</a:t>
+            </a:r>
+          </a:p>
+          <a:p>
+            <a:r>
+              <a:rPr lang="en-US" dirty="0"/>
+              <a:t>Not as high as state-of-the-art models (e.g., CEDNS with 2.39 on CAT2000 dataset)</a:t>
+            </a:r>
+          </a:p>
+          <a:p>
+            <a:r>
+              <a:rPr lang="en-US" dirty="0"/>
+              <a:t>PatchGan architecture (C64-C128-C256-C512) resulted in lower NSS score (1.3</a:t>
+            </a:r>
+            <a:r>
+              <a:rPr lang="el-GR"/>
+              <a:t>9</a:t>
+            </a:r>
             <a:r>
               <a:rPr lang="en-US"/>
-              <a:t>Compared to minimum human baseline of 1.54</a:t>
+              <a:t>)</a:t>
             </a:r>
+            <a:endParaRPr lang="en-US" dirty="0"/>
           </a:p>
           <a:p>
             <a:r>
-              <a:rPr lang="en-US"/>
-              <a:t>Not as high as state-of-the-art models (e.g., CEDNS with 2.39 on CAT2000 dataset)</a:t>
-            </a:r>
-          </a:p>
-          <a:p>
-            <a:r>
-              <a:rPr lang="en-US"/>
-              <a:t>PatchGan architecture (C64-C128-C256-C512) resulted in lower NSS score (1.37)</a:t>
-            </a:r>
-          </a:p>
-          <a:p>
-            <a:r>
-              <a:rPr lang="en-US"/>
+              <a:rPr lang="en-US" dirty="0"/>
               <a:t>NSS score indicates significant performance and potential of our model</a:t>
             </a:r>
-            <a:endParaRPr lang="el-GR"/>
+            <a:endParaRPr lang="el-GR" dirty="0"/>
           </a:p>
         </p:txBody>
       </p:sp>
@@ -22310,7 +22324,7 @@
           <a:p>
             <a:r>
               <a:rPr lang="en-US" dirty="0"/>
-              <a:t>Decoder: C1024-C2042-C1024-C512-C256-C128</a:t>
+              <a:t>Decoder: CD1024-CD2042-CD1024-C512-C256-C128</a:t>
             </a:r>
           </a:p>
           <a:p>
@@ -22330,13 +22344,6 @@
               <a:rPr lang="en-US" dirty="0"/>
               <a:t>Kernel size 3 and padding 1 in the bottleneck layer of decoder</a:t>
             </a:r>
-          </a:p>
-          <a:p>
-            <a:r>
-              <a:rPr lang="en-US" dirty="0"/>
-              <a:t>No use of dropout layers</a:t>
-            </a:r>
-            <a:endParaRPr lang="el-GR" dirty="0"/>
           </a:p>
         </p:txBody>
       </p:sp>

</xml_diff>